<commit_message>
slides: try-except-finally added to review ; exercises: terminal and imports
</commit_message>
<xml_diff>
--- a/slides/intro.pptx
+++ b/slides/intro.pptx
@@ -399,7 +399,7 @@
           <a:p>
             <a:fld id="{51673806-0BCD-1F42-BAA8-2011034B3C6A}" type="datetimeFigureOut">
               <a:rPr lang="en-US" smtClean="0"/>
-              <a:t>5/6/20</a:t>
+              <a:t>5/8/20</a:t>
             </a:fld>
             <a:endParaRPr lang="en-US"/>
           </a:p>
@@ -813,7 +813,7 @@
           <a:p>
             <a:fld id="{51673806-0BCD-1F42-BAA8-2011034B3C6A}" type="datetimeFigureOut">
               <a:rPr lang="en-US" smtClean="0"/>
-              <a:t>5/6/20</a:t>
+              <a:t>5/8/20</a:t>
             </a:fld>
             <a:endParaRPr lang="en-US"/>
           </a:p>
@@ -1144,7 +1144,7 @@
           <a:p>
             <a:fld id="{51673806-0BCD-1F42-BAA8-2011034B3C6A}" type="datetimeFigureOut">
               <a:rPr lang="en-US" smtClean="0"/>
-              <a:t>5/6/20</a:t>
+              <a:t>5/8/20</a:t>
             </a:fld>
             <a:endParaRPr lang="en-US"/>
           </a:p>
@@ -1544,7 +1544,7 @@
           <a:p>
             <a:fld id="{51673806-0BCD-1F42-BAA8-2011034B3C6A}" type="datetimeFigureOut">
               <a:rPr lang="en-US" smtClean="0"/>
-              <a:t>5/6/20</a:t>
+              <a:t>5/8/20</a:t>
             </a:fld>
             <a:endParaRPr lang="en-US"/>
           </a:p>
@@ -2107,7 +2107,7 @@
           <a:p>
             <a:fld id="{51673806-0BCD-1F42-BAA8-2011034B3C6A}" type="datetimeFigureOut">
               <a:rPr lang="en-US" smtClean="0"/>
-              <a:t>5/6/20</a:t>
+              <a:t>5/8/20</a:t>
             </a:fld>
             <a:endParaRPr lang="en-US"/>
           </a:p>
@@ -2783,7 +2783,7 @@
           <a:p>
             <a:fld id="{51673806-0BCD-1F42-BAA8-2011034B3C6A}" type="datetimeFigureOut">
               <a:rPr lang="en-US" smtClean="0"/>
-              <a:t>5/6/20</a:t>
+              <a:t>5/8/20</a:t>
             </a:fld>
             <a:endParaRPr lang="en-US"/>
           </a:p>
@@ -3691,7 +3691,7 @@
           <a:p>
             <a:fld id="{51673806-0BCD-1F42-BAA8-2011034B3C6A}" type="datetimeFigureOut">
               <a:rPr lang="en-US" smtClean="0"/>
-              <a:t>5/6/20</a:t>
+              <a:t>5/8/20</a:t>
             </a:fld>
             <a:endParaRPr lang="en-US"/>
           </a:p>
@@ -3999,7 +3999,7 @@
           <a:p>
             <a:fld id="{51673806-0BCD-1F42-BAA8-2011034B3C6A}" type="datetimeFigureOut">
               <a:rPr lang="en-US" smtClean="0"/>
-              <a:t>5/6/20</a:t>
+              <a:t>5/8/20</a:t>
             </a:fld>
             <a:endParaRPr lang="en-US"/>
           </a:p>
@@ -4258,7 +4258,7 @@
           <a:p>
             <a:fld id="{51673806-0BCD-1F42-BAA8-2011034B3C6A}" type="datetimeFigureOut">
               <a:rPr lang="en-US" smtClean="0"/>
-              <a:t>5/6/20</a:t>
+              <a:t>5/8/20</a:t>
             </a:fld>
             <a:endParaRPr lang="en-US"/>
           </a:p>
@@ -4581,7 +4581,7 @@
           <a:p>
             <a:fld id="{51673806-0BCD-1F42-BAA8-2011034B3C6A}" type="datetimeFigureOut">
               <a:rPr lang="en-US" smtClean="0"/>
-              <a:t>5/6/20</a:t>
+              <a:t>5/8/20</a:t>
             </a:fld>
             <a:endParaRPr lang="en-US"/>
           </a:p>
@@ -4965,7 +4965,7 @@
           <a:p>
             <a:fld id="{51673806-0BCD-1F42-BAA8-2011034B3C6A}" type="datetimeFigureOut">
               <a:rPr lang="en-US" smtClean="0"/>
-              <a:t>5/6/20</a:t>
+              <a:t>5/8/20</a:t>
             </a:fld>
             <a:endParaRPr lang="en-US"/>
           </a:p>
@@ -5341,7 +5341,7 @@
           <a:p>
             <a:fld id="{51673806-0BCD-1F42-BAA8-2011034B3C6A}" type="datetimeFigureOut">
               <a:rPr lang="en-US" smtClean="0"/>
-              <a:t>5/6/20</a:t>
+              <a:t>5/8/20</a:t>
             </a:fld>
             <a:endParaRPr lang="en-US"/>
           </a:p>
@@ -5847,7 +5847,7 @@
           <a:p>
             <a:fld id="{51673806-0BCD-1F42-BAA8-2011034B3C6A}" type="datetimeFigureOut">
               <a:rPr lang="en-US" smtClean="0"/>
-              <a:t>5/6/20</a:t>
+              <a:t>5/8/20</a:t>
             </a:fld>
             <a:endParaRPr lang="en-US"/>
           </a:p>
@@ -6104,7 +6104,7 @@
           <a:p>
             <a:fld id="{51673806-0BCD-1F42-BAA8-2011034B3C6A}" type="datetimeFigureOut">
               <a:rPr lang="en-US" smtClean="0"/>
-              <a:t>5/6/20</a:t>
+              <a:t>5/8/20</a:t>
             </a:fld>
             <a:endParaRPr lang="en-US"/>
           </a:p>
@@ -6262,7 +6262,7 @@
           <a:p>
             <a:fld id="{51673806-0BCD-1F42-BAA8-2011034B3C6A}" type="datetimeFigureOut">
               <a:rPr lang="en-US" smtClean="0"/>
-              <a:t>5/6/20</a:t>
+              <a:t>5/8/20</a:t>
             </a:fld>
             <a:endParaRPr lang="en-US"/>
           </a:p>
@@ -6652,7 +6652,7 @@
           <a:p>
             <a:fld id="{51673806-0BCD-1F42-BAA8-2011034B3C6A}" type="datetimeFigureOut">
               <a:rPr lang="en-US" smtClean="0"/>
-              <a:t>5/6/20</a:t>
+              <a:t>5/8/20</a:t>
             </a:fld>
             <a:endParaRPr lang="en-US"/>
           </a:p>
@@ -7061,7 +7061,7 @@
           <a:p>
             <a:fld id="{51673806-0BCD-1F42-BAA8-2011034B3C6A}" type="datetimeFigureOut">
               <a:rPr lang="en-US" smtClean="0"/>
-              <a:t>5/6/20</a:t>
+              <a:t>5/8/20</a:t>
             </a:fld>
             <a:endParaRPr lang="en-US"/>
           </a:p>
@@ -7309,7 +7309,7 @@
             <a:fld id="{51673806-0BCD-1F42-BAA8-2011034B3C6A}" type="datetimeFigureOut">
               <a:rPr lang="en-US" smtClean="0"/>
               <a:pPr/>
-              <a:t>5/6/20</a:t>
+              <a:t>5/8/20</a:t>
             </a:fld>
             <a:endParaRPr lang="en-US" dirty="0"/>
           </a:p>
@@ -7897,15 +7897,7 @@
             <a:pPr lvl="1"/>
             <a:r>
               <a:rPr lang="en-US" dirty="0" smtClean="0"/>
-              <a:t>Review of the basics: control structures, data types, functions</a:t>
-            </a:r>
-            <a:r>
-              <a:rPr lang="en-US" smtClean="0"/>
-              <a:t>, import, </a:t>
-            </a:r>
-            <a:r>
-              <a:rPr lang="en-US" dirty="0" smtClean="0"/>
-              <a:t>etc. </a:t>
+              <a:t>Review of the basics: control structures, data types, functions, import, etc. </a:t>
             </a:r>
           </a:p>
           <a:p>
@@ -7941,9 +7933,10 @@
           <a:p>
             <a:pPr lvl="2"/>
             <a:r>
-              <a:rPr lang="en-US" dirty="0" smtClean="0"/>
-              <a:t>Inheritance </a:t>
-            </a:r>
+              <a:rPr lang="en-US" smtClean="0"/>
+              <a:t>Inheritance and Composition </a:t>
+            </a:r>
+            <a:endParaRPr lang="en-US" dirty="0" smtClean="0"/>
           </a:p>
           <a:p>
             <a:pPr lvl="1"/>
@@ -8225,15 +8218,7 @@
             </a:r>
             <a:r>
               <a:rPr lang="en-US" dirty="0" smtClean="0"/>
-              <a:t>C) as of May </a:t>
-            </a:r>
-            <a:r>
-              <a:rPr lang="en-US" dirty="0" smtClean="0"/>
-              <a:t>6, </a:t>
-            </a:r>
-            <a:r>
-              <a:rPr lang="en-US" dirty="0" smtClean="0"/>
-              <a:t>2020 supporting Python &gt;= 3.5 (and 2.7 in initial release) </a:t>
+              <a:t>C) as of May 6, 2020 supporting Python &gt;= 3.5 (and 2.7 in initial release) </a:t>
             </a:r>
           </a:p>
           <a:p>
@@ -8379,17 +8364,12 @@
             </a:r>
             <a:r>
               <a:rPr lang="en-US" dirty="0" smtClean="0"/>
-              <a:t>4C</a:t>
-            </a:r>
-            <a:r>
-              <a:rPr lang="en-US" dirty="0" smtClean="0"/>
-              <a:t>, </a:t>
-            </a:r>
-            <a:r>
-              <a:rPr lang="en-US" dirty="0" smtClean="0"/>
-              <a:t>9D </a:t>
-            </a:r>
-            <a:endParaRPr lang="en-US" dirty="0" smtClean="0"/>
+              <a:t>6C</a:t>
+            </a:r>
+            <a:r>
+              <a:rPr lang="en-US" dirty="0" smtClean="0"/>
+              <a:t>, 9D </a:t>
+            </a:r>
           </a:p>
           <a:p>
             <a:pPr marL="0" marR="0" lvl="0" indent="0" defTabSz="914400" eaLnBrk="1" fontAlgn="auto" latinLnBrk="0" hangingPunct="1">
@@ -8438,23 +8418,15 @@
             </a:pPr>
             <a:r>
               <a:rPr lang="en-US" dirty="0" smtClean="0"/>
-              <a:t>Q2: </a:t>
-            </a:r>
-            <a:r>
-              <a:rPr lang="en-US" dirty="0" smtClean="0"/>
-              <a:t>8A</a:t>
-            </a:r>
-            <a:r>
-              <a:rPr lang="en-US" dirty="0" smtClean="0"/>
-              <a:t>, </a:t>
-            </a:r>
-            <a:r>
-              <a:rPr lang="en-US" dirty="0" smtClean="0"/>
-              <a:t>5B</a:t>
-            </a:r>
-            <a:r>
-              <a:rPr lang="en-US" dirty="0" smtClean="0"/>
-              <a:t>, 3C, 1D </a:t>
+              <a:t>Q2: 8A, 5B, </a:t>
+            </a:r>
+            <a:r>
+              <a:rPr lang="en-US" dirty="0" smtClean="0"/>
+              <a:t>5C</a:t>
+            </a:r>
+            <a:r>
+              <a:rPr lang="en-US" dirty="0" smtClean="0"/>
+              <a:t>, 1D </a:t>
             </a:r>
           </a:p>
           <a:p>
@@ -8553,11 +8525,19 @@
             </a:r>
             <a:r>
               <a:rPr lang="en-US" dirty="0" smtClean="0"/>
-              <a:t>7A</a:t>
-            </a:r>
-            <a:r>
-              <a:rPr lang="en-US" dirty="0" smtClean="0"/>
-              <a:t>, 5B, 3C, 2D </a:t>
+              <a:t>8A</a:t>
+            </a:r>
+            <a:r>
+              <a:rPr lang="en-US" dirty="0" smtClean="0"/>
+              <a:t>, </a:t>
+            </a:r>
+            <a:r>
+              <a:rPr lang="en-US" dirty="0" smtClean="0"/>
+              <a:t>6B</a:t>
+            </a:r>
+            <a:r>
+              <a:rPr lang="en-US" dirty="0" smtClean="0"/>
+              <a:t>, 3C, 2D </a:t>
             </a:r>
           </a:p>
           <a:p>
@@ -8611,17 +8591,12 @@
             </a:r>
             <a:r>
               <a:rPr lang="en-US" dirty="0" smtClean="0"/>
-              <a:t>6B</a:t>
-            </a:r>
-            <a:r>
-              <a:rPr lang="en-US" dirty="0" smtClean="0"/>
-              <a:t>, </a:t>
-            </a:r>
-            <a:r>
-              <a:rPr lang="en-US" dirty="0" smtClean="0"/>
-              <a:t>2C </a:t>
-            </a:r>
-            <a:endParaRPr lang="en-US" dirty="0" smtClean="0"/>
+              <a:t>8B</a:t>
+            </a:r>
+            <a:r>
+              <a:rPr lang="en-US" dirty="0" smtClean="0"/>
+              <a:t>, 2C </a:t>
+            </a:r>
           </a:p>
           <a:p>
             <a:pPr marL="0" marR="0" lvl="0" indent="0" defTabSz="914400" eaLnBrk="1" fontAlgn="auto" latinLnBrk="0" hangingPunct="1">
@@ -8675,7 +8650,7 @@
             </a:r>
             <a:r>
               <a:rPr lang="en-US" dirty="0" smtClean="0"/>
-              <a:t>7A</a:t>
+              <a:t>8A</a:t>
             </a:r>
             <a:r>
               <a:rPr lang="en-US" dirty="0" smtClean="0"/>
@@ -8683,12 +8658,9 @@
             </a:r>
             <a:r>
               <a:rPr lang="en-US" dirty="0" smtClean="0"/>
-              <a:t>8B</a:t>
-            </a:r>
-            <a:r>
-              <a:rPr lang="en-US" dirty="0" smtClean="0"/>
-              <a:t>, 2C </a:t>
-            </a:r>
+              <a:t>8B, 3C </a:t>
+            </a:r>
+            <a:endParaRPr lang="en-US" dirty="0" smtClean="0"/>
           </a:p>
           <a:p>
             <a:pPr marL="0" marR="0" lvl="0" indent="0" defTabSz="914400" eaLnBrk="1" fontAlgn="auto" latinLnBrk="0" hangingPunct="1">
@@ -8749,11 +8721,19 @@
             </a:r>
             <a:r>
               <a:rPr lang="en-US" dirty="0" smtClean="0"/>
-              <a:t>10A</a:t>
-            </a:r>
-            <a:r>
-              <a:rPr lang="en-US" dirty="0" smtClean="0"/>
-              <a:t>, 1B, 1D, 4E, 1F </a:t>
+              <a:t>11A</a:t>
+            </a:r>
+            <a:r>
+              <a:rPr lang="en-US" dirty="0" smtClean="0"/>
+              <a:t>, </a:t>
+            </a:r>
+            <a:r>
+              <a:rPr lang="en-US" dirty="0" smtClean="0"/>
+              <a:t>2B</a:t>
+            </a:r>
+            <a:r>
+              <a:rPr lang="en-US" dirty="0" smtClean="0"/>
+              <a:t>, 1D, 4E, 1F </a:t>
             </a:r>
           </a:p>
           <a:p>
@@ -8803,7 +8783,11 @@
             </a:pPr>
             <a:r>
               <a:rPr lang="en-US" dirty="0" smtClean="0"/>
-              <a:t>Q7: 3A</a:t>
+              <a:t>Q7: </a:t>
+            </a:r>
+            <a:r>
+              <a:rPr lang="en-US" dirty="0" smtClean="0"/>
+              <a:t>4A</a:t>
             </a:r>
             <a:r>
               <a:rPr lang="en-US" dirty="0" smtClean="0"/>
@@ -8811,7 +8795,7 @@
             </a:r>
             <a:r>
               <a:rPr lang="en-US" dirty="0"/>
-              <a:t>5</a:t>
+              <a:t>6</a:t>
             </a:r>
             <a:r>
               <a:rPr lang="en-US" dirty="0" smtClean="0"/>
@@ -9106,7 +9090,6 @@
               <a:rPr lang="en-US" dirty="0" smtClean="0"/>
               <a:t> all they do is open, create, edit, etc. plain text files </a:t>
             </a:r>
-            <a:endParaRPr lang="en-US" dirty="0" smtClean="0"/>
           </a:p>
           <a:p>
             <a:pPr lvl="1"/>
@@ -9130,7 +9113,6 @@
               <a:rPr lang="en-US" dirty="0" smtClean="0"/>
               <a:t> </a:t>
             </a:r>
-            <a:endParaRPr lang="en-US" dirty="0" smtClean="0"/>
           </a:p>
           <a:p>
             <a:pPr marL="0" indent="0">
@@ -9346,7 +9328,6 @@
               <a:rPr lang="en-US" dirty="0" smtClean="0"/>
               <a:t>You should think of a terminal as just a different interface on a Finder window </a:t>
             </a:r>
-            <a:endParaRPr lang="en-US" dirty="0" smtClean="0"/>
           </a:p>
           <a:p>
             <a:pPr marL="0" indent="0">

</xml_diff>

<commit_message>
slides: updated survey responses
</commit_message>
<xml_diff>
--- a/slides/intro.pptx
+++ b/slides/intro.pptx
@@ -208,7 +208,7 @@
           <a:p>
             <a:fld id="{D49A0B7E-B595-B14C-B05F-40313997F4EC}" type="datetimeFigureOut">
               <a:rPr lang="en-US" smtClean="0"/>
-              <a:t>5/7/21</a:t>
+              <a:t>5/10/21</a:t>
             </a:fld>
             <a:endParaRPr lang="en-US"/>
           </a:p>
@@ -751,7 +751,7 @@
           <a:p>
             <a:fld id="{51673806-0BCD-1F42-BAA8-2011034B3C6A}" type="datetimeFigureOut">
               <a:rPr lang="en-US" smtClean="0"/>
-              <a:t>5/7/21</a:t>
+              <a:t>5/10/21</a:t>
             </a:fld>
             <a:endParaRPr lang="en-US"/>
           </a:p>
@@ -1165,7 +1165,7 @@
           <a:p>
             <a:fld id="{51673806-0BCD-1F42-BAA8-2011034B3C6A}" type="datetimeFigureOut">
               <a:rPr lang="en-US" smtClean="0"/>
-              <a:t>5/7/21</a:t>
+              <a:t>5/10/21</a:t>
             </a:fld>
             <a:endParaRPr lang="en-US"/>
           </a:p>
@@ -1496,7 +1496,7 @@
           <a:p>
             <a:fld id="{51673806-0BCD-1F42-BAA8-2011034B3C6A}" type="datetimeFigureOut">
               <a:rPr lang="en-US" smtClean="0"/>
-              <a:t>5/7/21</a:t>
+              <a:t>5/10/21</a:t>
             </a:fld>
             <a:endParaRPr lang="en-US"/>
           </a:p>
@@ -1896,7 +1896,7 @@
           <a:p>
             <a:fld id="{51673806-0BCD-1F42-BAA8-2011034B3C6A}" type="datetimeFigureOut">
               <a:rPr lang="en-US" smtClean="0"/>
-              <a:t>5/7/21</a:t>
+              <a:t>5/10/21</a:t>
             </a:fld>
             <a:endParaRPr lang="en-US"/>
           </a:p>
@@ -2459,7 +2459,7 @@
           <a:p>
             <a:fld id="{51673806-0BCD-1F42-BAA8-2011034B3C6A}" type="datetimeFigureOut">
               <a:rPr lang="en-US" smtClean="0"/>
-              <a:t>5/7/21</a:t>
+              <a:t>5/10/21</a:t>
             </a:fld>
             <a:endParaRPr lang="en-US"/>
           </a:p>
@@ -3135,7 +3135,7 @@
           <a:p>
             <a:fld id="{51673806-0BCD-1F42-BAA8-2011034B3C6A}" type="datetimeFigureOut">
               <a:rPr lang="en-US" smtClean="0"/>
-              <a:t>5/7/21</a:t>
+              <a:t>5/10/21</a:t>
             </a:fld>
             <a:endParaRPr lang="en-US"/>
           </a:p>
@@ -4043,7 +4043,7 @@
           <a:p>
             <a:fld id="{51673806-0BCD-1F42-BAA8-2011034B3C6A}" type="datetimeFigureOut">
               <a:rPr lang="en-US" smtClean="0"/>
-              <a:t>5/7/21</a:t>
+              <a:t>5/10/21</a:t>
             </a:fld>
             <a:endParaRPr lang="en-US"/>
           </a:p>
@@ -4351,7 +4351,7 @@
           <a:p>
             <a:fld id="{51673806-0BCD-1F42-BAA8-2011034B3C6A}" type="datetimeFigureOut">
               <a:rPr lang="en-US" smtClean="0"/>
-              <a:t>5/7/21</a:t>
+              <a:t>5/10/21</a:t>
             </a:fld>
             <a:endParaRPr lang="en-US"/>
           </a:p>
@@ -4610,7 +4610,7 @@
           <a:p>
             <a:fld id="{51673806-0BCD-1F42-BAA8-2011034B3C6A}" type="datetimeFigureOut">
               <a:rPr lang="en-US" smtClean="0"/>
-              <a:t>5/7/21</a:t>
+              <a:t>5/10/21</a:t>
             </a:fld>
             <a:endParaRPr lang="en-US"/>
           </a:p>
@@ -4933,7 +4933,7 @@
           <a:p>
             <a:fld id="{51673806-0BCD-1F42-BAA8-2011034B3C6A}" type="datetimeFigureOut">
               <a:rPr lang="en-US" smtClean="0"/>
-              <a:t>5/7/21</a:t>
+              <a:t>5/10/21</a:t>
             </a:fld>
             <a:endParaRPr lang="en-US"/>
           </a:p>
@@ -5317,7 +5317,7 @@
           <a:p>
             <a:fld id="{51673806-0BCD-1F42-BAA8-2011034B3C6A}" type="datetimeFigureOut">
               <a:rPr lang="en-US" smtClean="0"/>
-              <a:t>5/7/21</a:t>
+              <a:t>5/10/21</a:t>
             </a:fld>
             <a:endParaRPr lang="en-US"/>
           </a:p>
@@ -5693,7 +5693,7 @@
           <a:p>
             <a:fld id="{51673806-0BCD-1F42-BAA8-2011034B3C6A}" type="datetimeFigureOut">
               <a:rPr lang="en-US" smtClean="0"/>
-              <a:t>5/7/21</a:t>
+              <a:t>5/10/21</a:t>
             </a:fld>
             <a:endParaRPr lang="en-US"/>
           </a:p>
@@ -6199,7 +6199,7 @@
           <a:p>
             <a:fld id="{51673806-0BCD-1F42-BAA8-2011034B3C6A}" type="datetimeFigureOut">
               <a:rPr lang="en-US" smtClean="0"/>
-              <a:t>5/7/21</a:t>
+              <a:t>5/10/21</a:t>
             </a:fld>
             <a:endParaRPr lang="en-US"/>
           </a:p>
@@ -6456,7 +6456,7 @@
           <a:p>
             <a:fld id="{51673806-0BCD-1F42-BAA8-2011034B3C6A}" type="datetimeFigureOut">
               <a:rPr lang="en-US" smtClean="0"/>
-              <a:t>5/7/21</a:t>
+              <a:t>5/10/21</a:t>
             </a:fld>
             <a:endParaRPr lang="en-US"/>
           </a:p>
@@ -6614,7 +6614,7 @@
           <a:p>
             <a:fld id="{51673806-0BCD-1F42-BAA8-2011034B3C6A}" type="datetimeFigureOut">
               <a:rPr lang="en-US" smtClean="0"/>
-              <a:t>5/7/21</a:t>
+              <a:t>5/10/21</a:t>
             </a:fld>
             <a:endParaRPr lang="en-US"/>
           </a:p>
@@ -7004,7 +7004,7 @@
           <a:p>
             <a:fld id="{51673806-0BCD-1F42-BAA8-2011034B3C6A}" type="datetimeFigureOut">
               <a:rPr lang="en-US" smtClean="0"/>
-              <a:t>5/7/21</a:t>
+              <a:t>5/10/21</a:t>
             </a:fld>
             <a:endParaRPr lang="en-US"/>
           </a:p>
@@ -7413,7 +7413,7 @@
           <a:p>
             <a:fld id="{51673806-0BCD-1F42-BAA8-2011034B3C6A}" type="datetimeFigureOut">
               <a:rPr lang="en-US" smtClean="0"/>
-              <a:t>5/7/21</a:t>
+              <a:t>5/10/21</a:t>
             </a:fld>
             <a:endParaRPr lang="en-US"/>
           </a:p>
@@ -7659,7 +7659,7 @@
             <a:fld id="{51673806-0BCD-1F42-BAA8-2011034B3C6A}" type="datetimeFigureOut">
               <a:rPr lang="en-US" smtClean="0"/>
               <a:pPr/>
-              <a:t>5/7/21</a:t>
+              <a:t>5/10/21</a:t>
             </a:fld>
             <a:endParaRPr lang="en-US" dirty="0"/>
           </a:p>
@@ -8987,7 +8987,7 @@
             </a:pPr>
             <a:r>
               <a:rPr lang="en-US" dirty="0"/>
-              <a:t>Q1: 4C, 12D, 1E </a:t>
+              <a:t>Q1: 4C, 13D, 1E </a:t>
             </a:r>
           </a:p>
           <a:p>
@@ -9033,7 +9033,7 @@
             </a:pPr>
             <a:r>
               <a:rPr lang="en-US" dirty="0"/>
-              <a:t>Q2: 4A, 6B, 6C, 1D </a:t>
+              <a:t>Q2: 4A, 7B, 6C, 1D </a:t>
             </a:r>
           </a:p>
           <a:p>
@@ -9123,7 +9123,7 @@
             </a:pPr>
             <a:r>
               <a:rPr lang="en-US" dirty="0"/>
-              <a:t>Q3: 4A, 10B, 2C, 1D </a:t>
+              <a:t>Q3: 5A, 10B, 2C, 1D </a:t>
             </a:r>
           </a:p>
           <a:p>
@@ -9169,7 +9169,7 @@
             </a:pPr>
             <a:r>
               <a:rPr lang="en-US" dirty="0"/>
-              <a:t>Q4: 9A, 8B </a:t>
+              <a:t>Q4: 10A, 8B </a:t>
             </a:r>
           </a:p>
           <a:p>
@@ -9215,7 +9215,7 @@
             </a:pPr>
             <a:r>
               <a:rPr lang="en-US" dirty="0"/>
-              <a:t>Q5: 11A, 3B, 1C, 1D, 1E </a:t>
+              <a:t>Q5: 11A, 4B, 1C, 1D, 1E </a:t>
             </a:r>
           </a:p>
           <a:p>
@@ -9261,7 +9261,7 @@
             </a:pPr>
             <a:r>
               <a:rPr lang="en-US" dirty="0"/>
-              <a:t>Q6: 5A, 3B, 5C, 2D, 2E </a:t>
+              <a:t>Q6: 5A, 4B, 5C, 2D, 2E </a:t>
             </a:r>
           </a:p>
           <a:p>

</xml_diff>